<commit_message>
New Python and MatLab Distribution
Features new WindowData function
</commit_message>
<xml_diff>
--- a/EntropyHub Flow Diagram.pptx
+++ b/EntropyHub Flow Diagram.pptx
@@ -198,7 +198,7 @@
           <a:p>
             <a:fld id="{43B874C8-5B68-4F42-B4B0-8A6B3FA49DD7}" type="datetimeFigureOut">
               <a:rPr lang="en-IE" smtClean="0"/>
-              <a:t>12/04/2024</a:t>
+              <a:t>19/04/2024</a:t>
             </a:fld>
             <a:endParaRPr lang="en-IE"/>
           </a:p>
@@ -771,7 +771,7 @@
           <a:p>
             <a:fld id="{360CD887-AF68-4398-A476-48B9E197C2EB}" type="datetimeFigureOut">
               <a:rPr lang="en-IE" smtClean="0"/>
-              <a:t>12/04/2024</a:t>
+              <a:t>19/04/2024</a:t>
             </a:fld>
             <a:endParaRPr lang="en-IE"/>
           </a:p>
@@ -941,7 +941,7 @@
           <a:p>
             <a:fld id="{360CD887-AF68-4398-A476-48B9E197C2EB}" type="datetimeFigureOut">
               <a:rPr lang="en-IE" smtClean="0"/>
-              <a:t>12/04/2024</a:t>
+              <a:t>19/04/2024</a:t>
             </a:fld>
             <a:endParaRPr lang="en-IE"/>
           </a:p>
@@ -1121,7 +1121,7 @@
           <a:p>
             <a:fld id="{360CD887-AF68-4398-A476-48B9E197C2EB}" type="datetimeFigureOut">
               <a:rPr lang="en-IE" smtClean="0"/>
-              <a:t>12/04/2024</a:t>
+              <a:t>19/04/2024</a:t>
             </a:fld>
             <a:endParaRPr lang="en-IE"/>
           </a:p>
@@ -1291,7 +1291,7 @@
           <a:p>
             <a:fld id="{360CD887-AF68-4398-A476-48B9E197C2EB}" type="datetimeFigureOut">
               <a:rPr lang="en-IE" smtClean="0"/>
-              <a:t>12/04/2024</a:t>
+              <a:t>19/04/2024</a:t>
             </a:fld>
             <a:endParaRPr lang="en-IE"/>
           </a:p>
@@ -1537,7 +1537,7 @@
           <a:p>
             <a:fld id="{360CD887-AF68-4398-A476-48B9E197C2EB}" type="datetimeFigureOut">
               <a:rPr lang="en-IE" smtClean="0"/>
-              <a:t>12/04/2024</a:t>
+              <a:t>19/04/2024</a:t>
             </a:fld>
             <a:endParaRPr lang="en-IE"/>
           </a:p>
@@ -1769,7 +1769,7 @@
           <a:p>
             <a:fld id="{360CD887-AF68-4398-A476-48B9E197C2EB}" type="datetimeFigureOut">
               <a:rPr lang="en-IE" smtClean="0"/>
-              <a:t>12/04/2024</a:t>
+              <a:t>19/04/2024</a:t>
             </a:fld>
             <a:endParaRPr lang="en-IE"/>
           </a:p>
@@ -2136,7 +2136,7 @@
           <a:p>
             <a:fld id="{360CD887-AF68-4398-A476-48B9E197C2EB}" type="datetimeFigureOut">
               <a:rPr lang="en-IE" smtClean="0"/>
-              <a:t>12/04/2024</a:t>
+              <a:t>19/04/2024</a:t>
             </a:fld>
             <a:endParaRPr lang="en-IE"/>
           </a:p>
@@ -2254,7 +2254,7 @@
           <a:p>
             <a:fld id="{360CD887-AF68-4398-A476-48B9E197C2EB}" type="datetimeFigureOut">
               <a:rPr lang="en-IE" smtClean="0"/>
-              <a:t>12/04/2024</a:t>
+              <a:t>19/04/2024</a:t>
             </a:fld>
             <a:endParaRPr lang="en-IE"/>
           </a:p>
@@ -2349,7 +2349,7 @@
           <a:p>
             <a:fld id="{360CD887-AF68-4398-A476-48B9E197C2EB}" type="datetimeFigureOut">
               <a:rPr lang="en-IE" smtClean="0"/>
-              <a:t>12/04/2024</a:t>
+              <a:t>19/04/2024</a:t>
             </a:fld>
             <a:endParaRPr lang="en-IE"/>
           </a:p>
@@ -2626,7 +2626,7 @@
           <a:p>
             <a:fld id="{360CD887-AF68-4398-A476-48B9E197C2EB}" type="datetimeFigureOut">
               <a:rPr lang="en-IE" smtClean="0"/>
-              <a:t>12/04/2024</a:t>
+              <a:t>19/04/2024</a:t>
             </a:fld>
             <a:endParaRPr lang="en-IE"/>
           </a:p>
@@ -2883,7 +2883,7 @@
           <a:p>
             <a:fld id="{360CD887-AF68-4398-A476-48B9E197C2EB}" type="datetimeFigureOut">
               <a:rPr lang="en-IE" smtClean="0"/>
-              <a:t>12/04/2024</a:t>
+              <a:t>19/04/2024</a:t>
             </a:fld>
             <a:endParaRPr lang="en-IE"/>
           </a:p>
@@ -3096,7 +3096,7 @@
           <a:p>
             <a:fld id="{360CD887-AF68-4398-A476-48B9E197C2EB}" type="datetimeFigureOut">
               <a:rPr lang="en-IE" smtClean="0"/>
-              <a:t>12/04/2024</a:t>
+              <a:t>19/04/2024</a:t>
             </a:fld>
             <a:endParaRPr lang="en-IE"/>
           </a:p>
@@ -6511,21 +6511,18 @@
               <a:t>Run this from outside code folder in </a:t>
             </a:r>
             <a:r>
-              <a:rPr lang="en-IE" sz="900" b="1" dirty="0" err="1">
-                <a:solidFill>
-                  <a:sysClr val="windowText" lastClr="000000"/>
-                </a:solidFill>
-              </a:rPr>
-              <a:t>cmd</a:t>
-            </a:r>
-            <a:r>
-              <a:rPr lang="en-IE" sz="900" b="1" dirty="0">
-                <a:solidFill>
-                  <a:sysClr val="windowText" lastClr="000000"/>
-                </a:solidFill>
-              </a:rPr>
-              <a:t>:</a:t>
-            </a:r>
+              <a:rPr lang="en-IE" sz="900" b="1">
+                <a:solidFill>
+                  <a:sysClr val="windowText" lastClr="000000"/>
+                </a:solidFill>
+              </a:rPr>
+              <a:t>anaconda prompt:</a:t>
+            </a:r>
+            <a:endParaRPr lang="en-IE" sz="900" b="1" dirty="0">
+              <a:solidFill>
+                <a:sysClr val="windowText" lastClr="000000"/>
+              </a:solidFill>
+            </a:endParaRPr>
           </a:p>
           <a:p>
             <a:pPr algn="ctr"/>
@@ -6626,25 +6623,7 @@
                 </a:solidFill>
                 <a:latin typeface="OCR A Extended" panose="02010509020102010303" pitchFamily="50" charset="0"/>
               </a:rPr>
-              <a:t>/* global-exclude */__</a:t>
-            </a:r>
-            <a:r>
-              <a:rPr lang="en-IE" sz="900" dirty="0" err="1">
-                <a:solidFill>
-                  <a:sysClr val="windowText" lastClr="000000"/>
-                </a:solidFill>
-                <a:latin typeface="OCR A Extended" panose="02010509020102010303" pitchFamily="50" charset="0"/>
-              </a:rPr>
-              <a:t>pycache</a:t>
-            </a:r>
-            <a:r>
-              <a:rPr lang="en-IE" sz="900" dirty="0">
-                <a:solidFill>
-                  <a:sysClr val="windowText" lastClr="000000"/>
-                </a:solidFill>
-                <a:latin typeface="OCR A Extended" panose="02010509020102010303" pitchFamily="50" charset="0"/>
-              </a:rPr>
-              <a:t>__/*</a:t>
+              <a:t>/*</a:t>
             </a:r>
           </a:p>
         </p:txBody>

</xml_diff>